<commit_message>
updated with a disjoint cycles questions
</commit_message>
<xml_diff>
--- a/MAT344-G1.pptx
+++ b/MAT344-G1.pptx
@@ -5,13 +5,15 @@
     <p:sldMasterId id="2147483648" r:id="rId1"/>
   </p:sldMasterIdLst>
   <p:sldIdLst>
-    <p:sldId id="256" r:id="rId2"/>
-    <p:sldId id="258" r:id="rId3"/>
-    <p:sldId id="259" r:id="rId4"/>
-    <p:sldId id="260" r:id="rId5"/>
-    <p:sldId id="261" r:id="rId6"/>
-    <p:sldId id="262" r:id="rId7"/>
-    <p:sldId id="257" r:id="rId8"/>
+    <p:sldId id="264" r:id="rId2"/>
+    <p:sldId id="256" r:id="rId3"/>
+    <p:sldId id="258" r:id="rId4"/>
+    <p:sldId id="259" r:id="rId5"/>
+    <p:sldId id="260" r:id="rId6"/>
+    <p:sldId id="261" r:id="rId7"/>
+    <p:sldId id="262" r:id="rId8"/>
+    <p:sldId id="263" r:id="rId9"/>
+    <p:sldId id="257" r:id="rId10"/>
   </p:sldIdLst>
   <p:sldSz cx="12192000" cy="6858000"/>
   <p:notesSz cx="6858000" cy="9144000"/>
@@ -265,7 +267,7 @@
           <a:p>
             <a:fld id="{49971634-096C-4282-A99E-216BB6FAD9F4}" type="datetimeFigureOut">
               <a:rPr lang="en-US" smtClean="0"/>
-              <a:t>11/19/2018</a:t>
+              <a:t>11/21/2018</a:t>
             </a:fld>
             <a:endParaRPr lang="en-US"/>
           </a:p>
@@ -463,7 +465,7 @@
           <a:p>
             <a:fld id="{49971634-096C-4282-A99E-216BB6FAD9F4}" type="datetimeFigureOut">
               <a:rPr lang="en-US" smtClean="0"/>
-              <a:t>11/19/2018</a:t>
+              <a:t>11/21/2018</a:t>
             </a:fld>
             <a:endParaRPr lang="en-US"/>
           </a:p>
@@ -671,7 +673,7 @@
           <a:p>
             <a:fld id="{49971634-096C-4282-A99E-216BB6FAD9F4}" type="datetimeFigureOut">
               <a:rPr lang="en-US" smtClean="0"/>
-              <a:t>11/19/2018</a:t>
+              <a:t>11/21/2018</a:t>
             </a:fld>
             <a:endParaRPr lang="en-US"/>
           </a:p>
@@ -869,7 +871,7 @@
           <a:p>
             <a:fld id="{49971634-096C-4282-A99E-216BB6FAD9F4}" type="datetimeFigureOut">
               <a:rPr lang="en-US" smtClean="0"/>
-              <a:t>11/19/2018</a:t>
+              <a:t>11/21/2018</a:t>
             </a:fld>
             <a:endParaRPr lang="en-US"/>
           </a:p>
@@ -1144,7 +1146,7 @@
           <a:p>
             <a:fld id="{49971634-096C-4282-A99E-216BB6FAD9F4}" type="datetimeFigureOut">
               <a:rPr lang="en-US" smtClean="0"/>
-              <a:t>11/19/2018</a:t>
+              <a:t>11/21/2018</a:t>
             </a:fld>
             <a:endParaRPr lang="en-US"/>
           </a:p>
@@ -1409,7 +1411,7 @@
           <a:p>
             <a:fld id="{49971634-096C-4282-A99E-216BB6FAD9F4}" type="datetimeFigureOut">
               <a:rPr lang="en-US" smtClean="0"/>
-              <a:t>11/19/2018</a:t>
+              <a:t>11/21/2018</a:t>
             </a:fld>
             <a:endParaRPr lang="en-US"/>
           </a:p>
@@ -1821,7 +1823,7 @@
           <a:p>
             <a:fld id="{49971634-096C-4282-A99E-216BB6FAD9F4}" type="datetimeFigureOut">
               <a:rPr lang="en-US" smtClean="0"/>
-              <a:t>11/19/2018</a:t>
+              <a:t>11/21/2018</a:t>
             </a:fld>
             <a:endParaRPr lang="en-US"/>
           </a:p>
@@ -1962,7 +1964,7 @@
           <a:p>
             <a:fld id="{49971634-096C-4282-A99E-216BB6FAD9F4}" type="datetimeFigureOut">
               <a:rPr lang="en-US" smtClean="0"/>
-              <a:t>11/19/2018</a:t>
+              <a:t>11/21/2018</a:t>
             </a:fld>
             <a:endParaRPr lang="en-US"/>
           </a:p>
@@ -2075,7 +2077,7 @@
           <a:p>
             <a:fld id="{49971634-096C-4282-A99E-216BB6FAD9F4}" type="datetimeFigureOut">
               <a:rPr lang="en-US" smtClean="0"/>
-              <a:t>11/19/2018</a:t>
+              <a:t>11/21/2018</a:t>
             </a:fld>
             <a:endParaRPr lang="en-US"/>
           </a:p>
@@ -2386,7 +2388,7 @@
           <a:p>
             <a:fld id="{49971634-096C-4282-A99E-216BB6FAD9F4}" type="datetimeFigureOut">
               <a:rPr lang="en-US" smtClean="0"/>
-              <a:t>11/19/2018</a:t>
+              <a:t>11/21/2018</a:t>
             </a:fld>
             <a:endParaRPr lang="en-US"/>
           </a:p>
@@ -2674,7 +2676,7 @@
           <a:p>
             <a:fld id="{49971634-096C-4282-A99E-216BB6FAD9F4}" type="datetimeFigureOut">
               <a:rPr lang="en-US" smtClean="0"/>
-              <a:t>11/19/2018</a:t>
+              <a:t>11/21/2018</a:t>
             </a:fld>
             <a:endParaRPr lang="en-US"/>
           </a:p>
@@ -2915,7 +2917,7 @@
           <a:p>
             <a:fld id="{49971634-096C-4282-A99E-216BB6FAD9F4}" type="datetimeFigureOut">
               <a:rPr lang="en-US" smtClean="0"/>
-              <a:t>11/19/2018</a:t>
+              <a:t>11/21/2018</a:t>
             </a:fld>
             <a:endParaRPr lang="en-US"/>
           </a:p>
@@ -3337,6 +3339,96 @@
           <p:cNvPr id="2" name="Title 1">
             <a:extLst>
               <a:ext uri="{FF2B5EF4-FFF2-40B4-BE49-F238E27FC236}">
+                <a16:creationId xmlns:a16="http://schemas.microsoft.com/office/drawing/2014/main" id="{493C05F6-8C43-438F-AE56-404BB2E824C0}"/>
+              </a:ext>
+            </a:extLst>
+          </p:cNvPr>
+          <p:cNvSpPr>
+            <a:spLocks noGrp="1"/>
+          </p:cNvSpPr>
+          <p:nvPr>
+            <p:ph type="ctrTitle"/>
+          </p:nvPr>
+        </p:nvSpPr>
+        <p:spPr/>
+        <p:txBody>
+          <a:bodyPr/>
+          <a:lstStyle/>
+          <a:p>
+            <a:r>
+              <a:rPr lang="en-US" dirty="0"/>
+              <a:t>MAT344 Combinatorics</a:t>
+            </a:r>
+            <a:br>
+              <a:rPr lang="en-US" dirty="0"/>
+            </a:br>
+            <a:r>
+              <a:rPr lang="en-US" dirty="0"/>
+              <a:t>Graph Theory</a:t>
+            </a:r>
+          </a:p>
+        </p:txBody>
+      </p:sp>
+      <p:sp>
+        <p:nvSpPr>
+          <p:cNvPr id="3" name="Subtitle 2">
+            <a:extLst>
+              <a:ext uri="{FF2B5EF4-FFF2-40B4-BE49-F238E27FC236}">
+                <a16:creationId xmlns:a16="http://schemas.microsoft.com/office/drawing/2014/main" id="{3B495838-4E16-42C1-80FD-1E4E43AC4668}"/>
+              </a:ext>
+            </a:extLst>
+          </p:cNvPr>
+          <p:cNvSpPr>
+            <a:spLocks noGrp="1"/>
+          </p:cNvSpPr>
+          <p:nvPr>
+            <p:ph type="subTitle" idx="1"/>
+          </p:nvPr>
+        </p:nvSpPr>
+        <p:spPr/>
+        <p:txBody>
+          <a:bodyPr/>
+          <a:lstStyle/>
+          <a:p>
+            <a:endParaRPr lang="en-US" dirty="0"/>
+          </a:p>
+        </p:txBody>
+      </p:sp>
+    </p:spTree>
+    <p:extLst>
+      <p:ext uri="{BB962C8B-B14F-4D97-AF65-F5344CB8AC3E}">
+        <p14:creationId xmlns:p14="http://schemas.microsoft.com/office/powerpoint/2010/main" val="250801310"/>
+      </p:ext>
+    </p:extLst>
+  </p:cSld>
+  <p:clrMapOvr>
+    <a:masterClrMapping/>
+  </p:clrMapOvr>
+</p:sld>
+</file>
+
+<file path=ppt/slides/slide2.xml><?xml version="1.0" encoding="utf-8"?>
+<p:sld xmlns:a="http://schemas.openxmlformats.org/drawingml/2006/main" xmlns:r="http://schemas.openxmlformats.org/officeDocument/2006/relationships" xmlns:p="http://schemas.openxmlformats.org/presentationml/2006/main">
+  <p:cSld>
+    <p:spTree>
+      <p:nvGrpSpPr>
+        <p:cNvPr id="1" name=""/>
+        <p:cNvGrpSpPr/>
+        <p:nvPr/>
+      </p:nvGrpSpPr>
+      <p:grpSpPr>
+        <a:xfrm>
+          <a:off x="0" y="0"/>
+          <a:ext cx="0" cy="0"/>
+          <a:chOff x="0" y="0"/>
+          <a:chExt cx="0" cy="0"/>
+        </a:xfrm>
+      </p:grpSpPr>
+      <p:sp>
+        <p:nvSpPr>
+          <p:cNvPr id="2" name="Title 1">
+            <a:extLst>
+              <a:ext uri="{FF2B5EF4-FFF2-40B4-BE49-F238E27FC236}">
                 <a16:creationId xmlns:a16="http://schemas.microsoft.com/office/drawing/2014/main" id="{F06F24A1-1529-443C-80F3-786B819387D3}"/>
               </a:ext>
             </a:extLst>
@@ -3680,7 +3772,7 @@
 </p:sld>
 </file>
 
-<file path=ppt/slides/slide2.xml><?xml version="1.0" encoding="utf-8"?>
+<file path=ppt/slides/slide3.xml><?xml version="1.0" encoding="utf-8"?>
 <p:sld xmlns:a="http://schemas.openxmlformats.org/drawingml/2006/main" xmlns:r="http://schemas.openxmlformats.org/officeDocument/2006/relationships" xmlns:p="http://schemas.openxmlformats.org/presentationml/2006/main">
   <p:cSld>
     <p:spTree>
@@ -4265,207 +4357,6 @@
 </p:sld>
 </file>
 
-<file path=ppt/slides/slide3.xml><?xml version="1.0" encoding="utf-8"?>
-<p:sld xmlns:a="http://schemas.openxmlformats.org/drawingml/2006/main" xmlns:r="http://schemas.openxmlformats.org/officeDocument/2006/relationships" xmlns:p="http://schemas.openxmlformats.org/presentationml/2006/main">
-  <p:cSld>
-    <p:spTree>
-      <p:nvGrpSpPr>
-        <p:cNvPr id="1" name=""/>
-        <p:cNvGrpSpPr/>
-        <p:nvPr/>
-      </p:nvGrpSpPr>
-      <p:grpSpPr>
-        <a:xfrm>
-          <a:off x="0" y="0"/>
-          <a:ext cx="0" cy="0"/>
-          <a:chOff x="0" y="0"/>
-          <a:chExt cx="0" cy="0"/>
-        </a:xfrm>
-      </p:grpSpPr>
-      <p:sp>
-        <p:nvSpPr>
-          <p:cNvPr id="2" name="Title 1">
-            <a:extLst>
-              <a:ext uri="{FF2B5EF4-FFF2-40B4-BE49-F238E27FC236}">
-                <a16:creationId xmlns:a16="http://schemas.microsoft.com/office/drawing/2014/main" id="{598838B8-491C-438C-B4E3-0F09312CA850}"/>
-              </a:ext>
-            </a:extLst>
-          </p:cNvPr>
-          <p:cNvSpPr>
-            <a:spLocks noGrp="1"/>
-          </p:cNvSpPr>
-          <p:nvPr>
-            <p:ph type="title"/>
-          </p:nvPr>
-        </p:nvSpPr>
-        <p:spPr/>
-        <p:txBody>
-          <a:bodyPr/>
-          <a:lstStyle/>
-          <a:p>
-            <a:r>
-              <a:rPr lang="en-CA" dirty="0"/>
-              <a:t>1. Prove that in any simple graph there are two vertices with the same degree.</a:t>
-            </a:r>
-            <a:endParaRPr lang="en-US" dirty="0"/>
-          </a:p>
-        </p:txBody>
-      </p:sp>
-      <p:sp>
-        <p:nvSpPr>
-          <p:cNvPr id="3" name="Content Placeholder 2">
-            <a:extLst>
-              <a:ext uri="{FF2B5EF4-FFF2-40B4-BE49-F238E27FC236}">
-                <a16:creationId xmlns:a16="http://schemas.microsoft.com/office/drawing/2014/main" id="{6624C7CB-845A-4292-B75A-3BA687B6271E}"/>
-              </a:ext>
-            </a:extLst>
-          </p:cNvPr>
-          <p:cNvSpPr>
-            <a:spLocks noGrp="1"/>
-          </p:cNvSpPr>
-          <p:nvPr>
-            <p:ph idx="1"/>
-          </p:nvPr>
-        </p:nvSpPr>
-        <p:spPr>
-          <a:xfrm>
-            <a:off x="838200" y="1825625"/>
-            <a:ext cx="10515600" cy="4667250"/>
-          </a:xfrm>
-        </p:spPr>
-        <p:txBody>
-          <a:bodyPr>
-            <a:normAutofit fontScale="92500" lnSpcReduction="10000"/>
-          </a:bodyPr>
-          <a:lstStyle/>
-          <a:p>
-            <a:r>
-              <a:rPr lang="en-CA" dirty="0"/>
-              <a:t>Proof by contradiction:</a:t>
-            </a:r>
-          </a:p>
-          <a:p>
-            <a:r>
-              <a:rPr lang="en-CA" dirty="0"/>
-              <a:t>Assume, that given a simple graph of </a:t>
-            </a:r>
-            <a:r>
-              <a:rPr lang="en-CA" b="1" dirty="0"/>
-              <a:t>n </a:t>
-            </a:r>
-            <a:r>
-              <a:rPr lang="en-CA" dirty="0"/>
-              <a:t>vertices, there does not exist any 2 vertices with the same degrees, i.e. degrees are </a:t>
-            </a:r>
-            <a:r>
-              <a:rPr lang="en-CA" b="1" dirty="0"/>
-              <a:t>distinct </a:t>
-            </a:r>
-            <a:r>
-              <a:rPr lang="en-CA" dirty="0"/>
-              <a:t>for distinct vertices.</a:t>
-            </a:r>
-          </a:p>
-          <a:p>
-            <a:r>
-              <a:rPr lang="en-CA" dirty="0"/>
-              <a:t>The set of possible distinct degrees for </a:t>
-            </a:r>
-            <a:r>
-              <a:rPr lang="en-CA" b="1" dirty="0"/>
-              <a:t>n</a:t>
-            </a:r>
-            <a:r>
-              <a:rPr lang="en-CA" dirty="0"/>
-              <a:t> vertices is </a:t>
-            </a:r>
-            <a:r>
-              <a:rPr lang="en-CA" b="1" dirty="0"/>
-              <a:t>{0, 1, 2, …, n-1}, </a:t>
-            </a:r>
-            <a:r>
-              <a:rPr lang="en-CA" dirty="0"/>
-              <a:t>which is of size n.</a:t>
-            </a:r>
-            <a:endParaRPr lang="en-CA" b="1" dirty="0"/>
-          </a:p>
-          <a:p>
-            <a:r>
-              <a:rPr lang="en-CA" dirty="0"/>
-              <a:t>Since we have n vertices and want them to have distinct degrees, we have to use all of the possible distinct degrees.</a:t>
-            </a:r>
-          </a:p>
-          <a:p>
-            <a:r>
-              <a:rPr lang="en-CA" dirty="0"/>
-              <a:t>Considering our graph; now we have a vertex with degree </a:t>
-            </a:r>
-            <a:r>
-              <a:rPr lang="en-CA" b="1" dirty="0"/>
-              <a:t>0</a:t>
-            </a:r>
-            <a:r>
-              <a:rPr lang="en-CA" dirty="0"/>
-              <a:t> and a vertex with degree </a:t>
-            </a:r>
-            <a:r>
-              <a:rPr lang="en-CA" b="1" dirty="0"/>
-              <a:t>n-1</a:t>
-            </a:r>
-            <a:r>
-              <a:rPr lang="en-CA" dirty="0"/>
-              <a:t>, which is impossible as the first one is connected to</a:t>
-            </a:r>
-            <a:r>
-              <a:rPr lang="en-CA" b="1" dirty="0"/>
-              <a:t> no other vertex</a:t>
-            </a:r>
-            <a:r>
-              <a:rPr lang="en-CA" dirty="0"/>
-              <a:t> and the latter is connected to </a:t>
-            </a:r>
-            <a:r>
-              <a:rPr lang="en-CA" b="1" dirty="0"/>
-              <a:t>every other vertex</a:t>
-            </a:r>
-            <a:r>
-              <a:rPr lang="en-CA" dirty="0"/>
-              <a:t>. </a:t>
-            </a:r>
-            <a:r>
-              <a:rPr lang="en-CA" b="1" dirty="0">
-                <a:solidFill>
-                  <a:srgbClr val="FF0000"/>
-                </a:solidFill>
-              </a:rPr>
-              <a:t>Contradiction</a:t>
-            </a:r>
-            <a:r>
-              <a:rPr lang="en-CA" dirty="0"/>
-              <a:t>.</a:t>
-            </a:r>
-          </a:p>
-          <a:p>
-            <a:pPr marL="0" indent="0">
-              <a:buNone/>
-            </a:pPr>
-            <a:endParaRPr lang="en-US" dirty="0"/>
-          </a:p>
-        </p:txBody>
-      </p:sp>
-    </p:spTree>
-    <p:extLst>
-      <p:ext uri="{BB962C8B-B14F-4D97-AF65-F5344CB8AC3E}">
-        <p14:creationId xmlns:p14="http://schemas.microsoft.com/office/powerpoint/2010/main" val="123049344"/>
-      </p:ext>
-    </p:extLst>
-  </p:cSld>
-  <p:clrMapOvr>
-    <a:masterClrMapping/>
-  </p:clrMapOvr>
-</p:sld>
-</file>
-
 <file path=ppt/slides/slide4.xml><?xml version="1.0" encoding="utf-8"?>
 <p:sld xmlns:a="http://schemas.openxmlformats.org/drawingml/2006/main" xmlns:r="http://schemas.openxmlformats.org/officeDocument/2006/relationships" xmlns:p="http://schemas.openxmlformats.org/presentationml/2006/main">
   <p:cSld>
@@ -4488,7 +4379,7 @@
           <p:cNvPr id="2" name="Title 1">
             <a:extLst>
               <a:ext uri="{FF2B5EF4-FFF2-40B4-BE49-F238E27FC236}">
-                <a16:creationId xmlns:a16="http://schemas.microsoft.com/office/drawing/2014/main" id="{7AA18DB2-90A1-4E71-ABEE-26762F37DF03}"/>
+                <a16:creationId xmlns:a16="http://schemas.microsoft.com/office/drawing/2014/main" id="{598838B8-491C-438C-B4E3-0F09312CA850}"/>
               </a:ext>
             </a:extLst>
           </p:cNvPr>
@@ -4497,169 +4388,167 @@
           </p:cNvSpPr>
           <p:nvPr>
             <p:ph type="title"/>
+          </p:nvPr>
+        </p:nvSpPr>
+        <p:spPr/>
+        <p:txBody>
+          <a:bodyPr/>
+          <a:lstStyle/>
+          <a:p>
+            <a:r>
+              <a:rPr lang="en-CA" dirty="0"/>
+              <a:t>1. Prove that in any simple graph there are two vertices with the same degree.</a:t>
+            </a:r>
+            <a:endParaRPr lang="en-US" dirty="0"/>
+          </a:p>
+        </p:txBody>
+      </p:sp>
+      <p:sp>
+        <p:nvSpPr>
+          <p:cNvPr id="3" name="Content Placeholder 2">
+            <a:extLst>
+              <a:ext uri="{FF2B5EF4-FFF2-40B4-BE49-F238E27FC236}">
+                <a16:creationId xmlns:a16="http://schemas.microsoft.com/office/drawing/2014/main" id="{6624C7CB-845A-4292-B75A-3BA687B6271E}"/>
+              </a:ext>
+            </a:extLst>
+          </p:cNvPr>
+          <p:cNvSpPr>
+            <a:spLocks noGrp="1"/>
+          </p:cNvSpPr>
+          <p:nvPr>
+            <p:ph idx="1"/>
           </p:nvPr>
         </p:nvSpPr>
         <p:spPr>
           <a:xfrm>
-            <a:off x="838200" y="365125"/>
-            <a:ext cx="10515600" cy="1296698"/>
+            <a:off x="838200" y="1825625"/>
+            <a:ext cx="10515600" cy="4667250"/>
           </a:xfrm>
         </p:spPr>
         <p:txBody>
           <a:bodyPr>
-            <a:normAutofit/>
+            <a:normAutofit fontScale="92500" lnSpcReduction="10000"/>
           </a:bodyPr>
           <a:lstStyle/>
           <a:p>
             <a:r>
-              <a:rPr lang="en-CA" sz="2800" dirty="0"/>
-              <a:t>2. Ten players participate in a chess tournament. Eleven games have been played so far. Prove that at least one player has played at least three games.</a:t>
-            </a:r>
-            <a:endParaRPr lang="en-US" sz="2800" dirty="0"/>
-          </a:p>
-        </p:txBody>
-      </p:sp>
-      <p:sp>
-        <p:nvSpPr>
-          <p:cNvPr id="3" name="Content Placeholder 2">
-            <a:extLst>
-              <a:ext uri="{FF2B5EF4-FFF2-40B4-BE49-F238E27FC236}">
-                <a16:creationId xmlns:a16="http://schemas.microsoft.com/office/drawing/2014/main" id="{70767B6D-F951-4228-82D1-1BF8442190A0}"/>
-              </a:ext>
-            </a:extLst>
-          </p:cNvPr>
-          <p:cNvSpPr>
-            <a:spLocks noGrp="1"/>
-          </p:cNvSpPr>
-          <p:nvPr>
-            <p:ph idx="1"/>
-          </p:nvPr>
-        </p:nvSpPr>
-        <p:spPr>
-          <a:xfrm>
-            <a:off x="838200" y="1661823"/>
-            <a:ext cx="10515600" cy="4831052"/>
-          </a:xfrm>
-        </p:spPr>
-        <p:txBody>
-          <a:bodyPr>
-            <a:normAutofit fontScale="85000" lnSpcReduction="10000"/>
-          </a:bodyPr>
-          <a:lstStyle/>
-          <a:p>
-            <a:r>
-              <a:rPr lang="en-CA" dirty="0"/>
-              <a:t>Loops are </a:t>
+              <a:rPr lang="en-CA" dirty="0"/>
+              <a:t>Proof by contradiction:</a:t>
+            </a:r>
+          </a:p>
+          <a:p>
+            <a:r>
+              <a:rPr lang="en-CA" dirty="0"/>
+              <a:t>Assume, that given a simple graph of </a:t>
             </a:r>
             <a:r>
               <a:rPr lang="en-CA" b="1" dirty="0"/>
-              <a:t>not</a:t>
-            </a:r>
-            <a:r>
-              <a:rPr lang="en-CA" dirty="0"/>
-              <a:t> allowed, as no player plays against him/her self.</a:t>
-            </a:r>
-          </a:p>
-          <a:p>
-            <a:r>
-              <a:rPr lang="en-CA" dirty="0"/>
-              <a:t>Proof by contradiction.</a:t>
-            </a:r>
-          </a:p>
-          <a:p>
-            <a:r>
-              <a:rPr lang="en-CA" dirty="0"/>
-              <a:t>Assume, that it is possible that </a:t>
+              <a:t>n </a:t>
+            </a:r>
+            <a:r>
+              <a:rPr lang="en-CA" dirty="0"/>
+              <a:t>vertices, there does not exist any 2 vertices with the same degrees, i.e. degrees are </a:t>
             </a:r>
             <a:r>
               <a:rPr lang="en-CA" b="1" dirty="0"/>
-              <a:t>11 games </a:t>
-            </a:r>
-            <a:r>
-              <a:rPr lang="en-CA" dirty="0"/>
-              <a:t>have been played and each player has played </a:t>
+              <a:t>distinct </a:t>
+            </a:r>
+            <a:r>
+              <a:rPr lang="en-CA" dirty="0"/>
+              <a:t>for distinct vertices.</a:t>
+            </a:r>
+          </a:p>
+          <a:p>
+            <a:r>
+              <a:rPr lang="en-CA" dirty="0"/>
+              <a:t>The set of possible distinct degrees for </a:t>
             </a:r>
             <a:r>
               <a:rPr lang="en-CA" b="1" dirty="0"/>
-              <a:t>at most 2</a:t>
-            </a:r>
-            <a:r>
-              <a:rPr lang="en-CA" dirty="0"/>
-              <a:t> games. </a:t>
-            </a:r>
-          </a:p>
-          <a:p>
-            <a:r>
-              <a:rPr lang="en-CA" dirty="0"/>
-              <a:t>Each player is a vertex, and the number of games they have played is the degree of that vertex. </a:t>
-            </a:r>
-          </a:p>
-          <a:p>
-            <a:r>
-              <a:rPr lang="en-CA" dirty="0"/>
-              <a:t>Players who have played a </a:t>
+              <a:t>n</a:t>
+            </a:r>
+            <a:r>
+              <a:rPr lang="en-CA" dirty="0"/>
+              <a:t> vertices is </a:t>
             </a:r>
             <a:r>
               <a:rPr lang="en-CA" b="1" dirty="0"/>
-              <a:t>game</a:t>
-            </a:r>
-            <a:r>
-              <a:rPr lang="en-CA" dirty="0"/>
-              <a:t> against each other are connected by an edge.</a:t>
-            </a:r>
-          </a:p>
-          <a:p>
-            <a:r>
-              <a:rPr lang="en-CA" dirty="0"/>
-              <a:t>By our assumption the degree of each player is</a:t>
+              <a:t>{0, 1, 2, …, n-1}, </a:t>
+            </a:r>
+            <a:r>
+              <a:rPr lang="en-CA" dirty="0"/>
+              <a:t>which is of size n.</a:t>
+            </a:r>
+            <a:endParaRPr lang="en-CA" b="1" dirty="0"/>
+          </a:p>
+          <a:p>
+            <a:r>
+              <a:rPr lang="en-CA" dirty="0"/>
+              <a:t>Since we have n vertices and want them to have distinct degrees, we have to use all of the possible distinct degrees.</a:t>
+            </a:r>
+          </a:p>
+          <a:p>
+            <a:r>
+              <a:rPr lang="en-CA" dirty="0"/>
+              <a:t>Considering our graph; now we have a vertex with degree </a:t>
             </a:r>
             <a:r>
               <a:rPr lang="en-CA" b="1" dirty="0"/>
-              <a:t> at most 2</a:t>
-            </a:r>
-            <a:r>
-              <a:rPr lang="en-CA" dirty="0"/>
-              <a:t>:</a:t>
-            </a:r>
-          </a:p>
-          <a:p>
-            <a:pPr algn="ctr"/>
+              <a:t>0</a:t>
+            </a:r>
+            <a:r>
+              <a:rPr lang="en-CA" dirty="0"/>
+              <a:t> and a vertex with degree </a:t>
+            </a:r>
             <a:r>
               <a:rPr lang="en-CA" b="1" dirty="0"/>
-              <a:t>d1 &lt;=2</a:t>
-            </a:r>
-            <a:endParaRPr lang="en-CA" dirty="0"/>
-          </a:p>
-          <a:p>
-            <a:pPr algn="ctr"/>
+              <a:t>n-1</a:t>
+            </a:r>
+            <a:r>
+              <a:rPr lang="en-CA" dirty="0"/>
+              <a:t>, which is impossible as the first one is connected to</a:t>
+            </a:r>
             <a:r>
               <a:rPr lang="en-CA" b="1" dirty="0"/>
-              <a:t>d2&lt;=2</a:t>
-            </a:r>
-            <a:endParaRPr lang="en-CA" dirty="0"/>
-          </a:p>
-          <a:p>
-            <a:pPr algn="ctr"/>
+              <a:t> no other vertex</a:t>
+            </a:r>
+            <a:r>
+              <a:rPr lang="en-CA" dirty="0"/>
+              <a:t> and the latter is connected to </a:t>
+            </a:r>
             <a:r>
               <a:rPr lang="en-CA" b="1" dirty="0"/>
-              <a:t>d3&lt;=2</a:t>
-            </a:r>
-            <a:endParaRPr lang="en-CA" dirty="0"/>
-          </a:p>
-          <a:p>
-            <a:pPr algn="ctr"/>
-            <a:r>
-              <a:rPr lang="en-CA" b="1" dirty="0"/>
-              <a:t>d10&lt;=2</a:t>
-            </a:r>
-            <a:endParaRPr lang="en-CA" dirty="0"/>
+              <a:t>every other vertex</a:t>
+            </a:r>
+            <a:r>
+              <a:rPr lang="en-CA" dirty="0"/>
+              <a:t>. </a:t>
+            </a:r>
+            <a:r>
+              <a:rPr lang="en-CA" b="1" dirty="0">
+                <a:solidFill>
+                  <a:srgbClr val="FF0000"/>
+                </a:solidFill>
+              </a:rPr>
+              <a:t>Contradiction</a:t>
+            </a:r>
+            <a:r>
+              <a:rPr lang="en-CA" dirty="0"/>
+              <a:t>.</a:t>
+            </a:r>
+          </a:p>
+          <a:p>
+            <a:pPr marL="0" indent="0">
+              <a:buNone/>
+            </a:pPr>
+            <a:endParaRPr lang="en-US" dirty="0"/>
           </a:p>
         </p:txBody>
       </p:sp>
     </p:spTree>
     <p:extLst>
       <p:ext uri="{BB962C8B-B14F-4D97-AF65-F5344CB8AC3E}">
-        <p14:creationId xmlns:p14="http://schemas.microsoft.com/office/powerpoint/2010/main" val="3193831284"/>
+        <p14:creationId xmlns:p14="http://schemas.microsoft.com/office/powerpoint/2010/main" val="123049344"/>
       </p:ext>
     </p:extLst>
   </p:cSld>
@@ -4746,13 +4635,87 @@
         </p:spPr>
         <p:txBody>
           <a:bodyPr>
-            <a:normAutofit fontScale="70000" lnSpcReduction="20000"/>
+            <a:normAutofit fontScale="85000" lnSpcReduction="10000"/>
           </a:bodyPr>
           <a:lstStyle/>
           <a:p>
-            <a:pPr marL="0" indent="0" algn="ctr">
-              <a:buNone/>
-            </a:pPr>
+            <a:r>
+              <a:rPr lang="en-CA" dirty="0"/>
+              <a:t>Loops are </a:t>
+            </a:r>
+            <a:r>
+              <a:rPr lang="en-CA" b="1" dirty="0"/>
+              <a:t>not</a:t>
+            </a:r>
+            <a:r>
+              <a:rPr lang="en-CA" dirty="0"/>
+              <a:t> allowed, as no player plays against him/her self.</a:t>
+            </a:r>
+          </a:p>
+          <a:p>
+            <a:r>
+              <a:rPr lang="en-CA" dirty="0"/>
+              <a:t>Proof by contradiction.</a:t>
+            </a:r>
+          </a:p>
+          <a:p>
+            <a:r>
+              <a:rPr lang="en-CA" dirty="0"/>
+              <a:t>Assume, that it is possible that </a:t>
+            </a:r>
+            <a:r>
+              <a:rPr lang="en-CA" b="1" dirty="0"/>
+              <a:t>11 games </a:t>
+            </a:r>
+            <a:r>
+              <a:rPr lang="en-CA" dirty="0"/>
+              <a:t>have been played and each player has played </a:t>
+            </a:r>
+            <a:r>
+              <a:rPr lang="en-CA" b="1" dirty="0"/>
+              <a:t>at most 2</a:t>
+            </a:r>
+            <a:r>
+              <a:rPr lang="en-CA" dirty="0"/>
+              <a:t> games. </a:t>
+            </a:r>
+          </a:p>
+          <a:p>
+            <a:r>
+              <a:rPr lang="en-CA" dirty="0"/>
+              <a:t>Each player is a vertex, and the number of games they have played is the degree of that vertex. </a:t>
+            </a:r>
+          </a:p>
+          <a:p>
+            <a:r>
+              <a:rPr lang="en-CA" dirty="0"/>
+              <a:t>Players who have played a </a:t>
+            </a:r>
+            <a:r>
+              <a:rPr lang="en-CA" b="1" dirty="0"/>
+              <a:t>game</a:t>
+            </a:r>
+            <a:r>
+              <a:rPr lang="en-CA" dirty="0"/>
+              <a:t> against each other are connected by an edge.</a:t>
+            </a:r>
+          </a:p>
+          <a:p>
+            <a:r>
+              <a:rPr lang="en-CA" dirty="0"/>
+              <a:t>By our assumption the degree of each player is</a:t>
+            </a:r>
+            <a:r>
+              <a:rPr lang="en-CA" b="1" dirty="0"/>
+              <a:t> at most 2</a:t>
+            </a:r>
+            <a:r>
+              <a:rPr lang="en-CA" dirty="0"/>
+              <a:t>:</a:t>
+            </a:r>
+          </a:p>
+          <a:p>
+            <a:pPr algn="ctr"/>
             <a:r>
               <a:rPr lang="en-CA" b="1" dirty="0"/>
               <a:t>d1 &lt;=2</a:t>
@@ -4760,9 +4723,7 @@
             <a:endParaRPr lang="en-CA" dirty="0"/>
           </a:p>
           <a:p>
-            <a:pPr marL="0" indent="0" algn="ctr">
-              <a:buNone/>
-            </a:pPr>
+            <a:pPr algn="ctr"/>
             <a:r>
               <a:rPr lang="en-CA" b="1" dirty="0"/>
               <a:t>d2&lt;=2</a:t>
@@ -4770,124 +4731,27 @@
             <a:endParaRPr lang="en-CA" dirty="0"/>
           </a:p>
           <a:p>
-            <a:pPr marL="0" indent="0" algn="ctr">
-              <a:buNone/>
-            </a:pPr>
+            <a:pPr algn="ctr"/>
             <a:r>
               <a:rPr lang="en-CA" b="1" dirty="0"/>
               <a:t>d3&lt;=2</a:t>
             </a:r>
-          </a:p>
-          <a:p>
-            <a:pPr marL="0" indent="0" algn="ctr">
-              <a:buNone/>
-            </a:pPr>
-            <a:r>
-              <a:rPr lang="en-CA" dirty="0"/>
-              <a:t>.</a:t>
-            </a:r>
-          </a:p>
-          <a:p>
-            <a:pPr marL="0" indent="0" algn="ctr">
-              <a:buNone/>
-            </a:pPr>
-            <a:r>
-              <a:rPr lang="en-CA" dirty="0"/>
-              <a:t>.</a:t>
-            </a:r>
-          </a:p>
-          <a:p>
-            <a:pPr marL="0" indent="0" algn="ctr">
-              <a:buNone/>
-            </a:pPr>
-            <a:r>
-              <a:rPr lang="en-CA" dirty="0"/>
-              <a:t>.</a:t>
-            </a:r>
-          </a:p>
-          <a:p>
-            <a:pPr marL="0" indent="0" algn="ctr">
-              <a:buNone/>
-            </a:pPr>
+            <a:endParaRPr lang="en-CA" dirty="0"/>
+          </a:p>
+          <a:p>
+            <a:pPr algn="ctr"/>
             <a:r>
               <a:rPr lang="en-CA" b="1" dirty="0"/>
               <a:t>d10&lt;=2</a:t>
             </a:r>
-          </a:p>
-          <a:p>
-            <a:pPr marL="0" indent="0" algn="ctr">
-              <a:buNone/>
-            </a:pPr>
-            <a:r>
-              <a:rPr lang="en-CA" b="1" dirty="0"/>
-              <a:t>Then: d1+d2+d3+...+d10&lt;=20=2x10, then |E| &lt;=10</a:t>
-            </a:r>
-          </a:p>
-          <a:p>
-            <a:pPr marL="0" indent="0" algn="ctr">
-              <a:buNone/>
-            </a:pPr>
-            <a:endParaRPr lang="en-CA" b="1" dirty="0"/>
-          </a:p>
-          <a:p>
-            <a:r>
-              <a:rPr lang="en-CA" dirty="0"/>
-              <a:t>By the degree sum formula, </a:t>
-            </a:r>
-          </a:p>
-          <a:p>
-            <a:r>
-              <a:rPr lang="en-CA" b="1" dirty="0"/>
-              <a:t>the sum of the total number of degrees = 2 x total number of edges.</a:t>
-            </a:r>
             <a:endParaRPr lang="en-CA" dirty="0"/>
-          </a:p>
-          <a:p>
-            <a:r>
-              <a:rPr lang="en-CA" dirty="0"/>
-              <a:t>This implies that the </a:t>
-            </a:r>
-            <a:r>
-              <a:rPr lang="en-CA" b="1" dirty="0"/>
-              <a:t>maximum</a:t>
-            </a:r>
-            <a:r>
-              <a:rPr lang="en-CA" dirty="0"/>
-              <a:t> number of edges, i.e. games, is </a:t>
-            </a:r>
-            <a:r>
-              <a:rPr lang="en-CA" b="1" dirty="0"/>
-              <a:t>10</a:t>
-            </a:r>
-            <a:r>
-              <a:rPr lang="en-CA" dirty="0"/>
-              <a:t>, which is a </a:t>
-            </a:r>
-            <a:r>
-              <a:rPr lang="en-CA" b="1" dirty="0">
-                <a:solidFill>
-                  <a:srgbClr val="FF0000"/>
-                </a:solidFill>
-              </a:rPr>
-              <a:t>contradiction</a:t>
-            </a:r>
-            <a:r>
-              <a:rPr lang="en-CA" dirty="0"/>
-              <a:t>.</a:t>
-            </a:r>
-          </a:p>
-          <a:p>
-            <a:r>
-              <a:rPr lang="en-CA" dirty="0"/>
-              <a:t>Therefore; there has to be at least one player who has played at least 3 games.</a:t>
-            </a:r>
           </a:p>
         </p:txBody>
       </p:sp>
     </p:spTree>
     <p:extLst>
       <p:ext uri="{BB962C8B-B14F-4D97-AF65-F5344CB8AC3E}">
-        <p14:creationId xmlns:p14="http://schemas.microsoft.com/office/powerpoint/2010/main" val="2864509609"/>
+        <p14:creationId xmlns:p14="http://schemas.microsoft.com/office/powerpoint/2010/main" val="3193831284"/>
       </p:ext>
     </p:extLst>
   </p:cSld>
@@ -4919,6 +4783,234 @@
           <p:cNvPr id="2" name="Title 1">
             <a:extLst>
               <a:ext uri="{FF2B5EF4-FFF2-40B4-BE49-F238E27FC236}">
+                <a16:creationId xmlns:a16="http://schemas.microsoft.com/office/drawing/2014/main" id="{7AA18DB2-90A1-4E71-ABEE-26762F37DF03}"/>
+              </a:ext>
+            </a:extLst>
+          </p:cNvPr>
+          <p:cNvSpPr>
+            <a:spLocks noGrp="1"/>
+          </p:cNvSpPr>
+          <p:nvPr>
+            <p:ph type="title"/>
+          </p:nvPr>
+        </p:nvSpPr>
+        <p:spPr>
+          <a:xfrm>
+            <a:off x="838200" y="365125"/>
+            <a:ext cx="10515600" cy="1296698"/>
+          </a:xfrm>
+        </p:spPr>
+        <p:txBody>
+          <a:bodyPr>
+            <a:normAutofit/>
+          </a:bodyPr>
+          <a:lstStyle/>
+          <a:p>
+            <a:r>
+              <a:rPr lang="en-CA" sz="2800" dirty="0"/>
+              <a:t>2. Ten players participate in a chess tournament. Eleven games have been played so far. Prove that at least one player has played at least three games.</a:t>
+            </a:r>
+            <a:endParaRPr lang="en-US" sz="2800" dirty="0"/>
+          </a:p>
+        </p:txBody>
+      </p:sp>
+      <p:sp>
+        <p:nvSpPr>
+          <p:cNvPr id="3" name="Content Placeholder 2">
+            <a:extLst>
+              <a:ext uri="{FF2B5EF4-FFF2-40B4-BE49-F238E27FC236}">
+                <a16:creationId xmlns:a16="http://schemas.microsoft.com/office/drawing/2014/main" id="{70767B6D-F951-4228-82D1-1BF8442190A0}"/>
+              </a:ext>
+            </a:extLst>
+          </p:cNvPr>
+          <p:cNvSpPr>
+            <a:spLocks noGrp="1"/>
+          </p:cNvSpPr>
+          <p:nvPr>
+            <p:ph idx="1"/>
+          </p:nvPr>
+        </p:nvSpPr>
+        <p:spPr>
+          <a:xfrm>
+            <a:off x="838200" y="1661823"/>
+            <a:ext cx="10515600" cy="4831052"/>
+          </a:xfrm>
+        </p:spPr>
+        <p:txBody>
+          <a:bodyPr>
+            <a:normAutofit fontScale="70000" lnSpcReduction="20000"/>
+          </a:bodyPr>
+          <a:lstStyle/>
+          <a:p>
+            <a:pPr marL="0" indent="0" algn="ctr">
+              <a:buNone/>
+            </a:pPr>
+            <a:r>
+              <a:rPr lang="en-CA" b="1" dirty="0"/>
+              <a:t>d1 &lt;=2</a:t>
+            </a:r>
+            <a:endParaRPr lang="en-CA" dirty="0"/>
+          </a:p>
+          <a:p>
+            <a:pPr marL="0" indent="0" algn="ctr">
+              <a:buNone/>
+            </a:pPr>
+            <a:r>
+              <a:rPr lang="en-CA" b="1" dirty="0"/>
+              <a:t>d2&lt;=2</a:t>
+            </a:r>
+            <a:endParaRPr lang="en-CA" dirty="0"/>
+          </a:p>
+          <a:p>
+            <a:pPr marL="0" indent="0" algn="ctr">
+              <a:buNone/>
+            </a:pPr>
+            <a:r>
+              <a:rPr lang="en-CA" b="1" dirty="0"/>
+              <a:t>d3&lt;=2</a:t>
+            </a:r>
+          </a:p>
+          <a:p>
+            <a:pPr marL="0" indent="0" algn="ctr">
+              <a:buNone/>
+            </a:pPr>
+            <a:r>
+              <a:rPr lang="en-CA" dirty="0"/>
+              <a:t>.</a:t>
+            </a:r>
+          </a:p>
+          <a:p>
+            <a:pPr marL="0" indent="0" algn="ctr">
+              <a:buNone/>
+            </a:pPr>
+            <a:r>
+              <a:rPr lang="en-CA" dirty="0"/>
+              <a:t>.</a:t>
+            </a:r>
+          </a:p>
+          <a:p>
+            <a:pPr marL="0" indent="0" algn="ctr">
+              <a:buNone/>
+            </a:pPr>
+            <a:r>
+              <a:rPr lang="en-CA" dirty="0"/>
+              <a:t>.</a:t>
+            </a:r>
+          </a:p>
+          <a:p>
+            <a:pPr marL="0" indent="0" algn="ctr">
+              <a:buNone/>
+            </a:pPr>
+            <a:r>
+              <a:rPr lang="en-CA" b="1" dirty="0"/>
+              <a:t>d10&lt;=2</a:t>
+            </a:r>
+          </a:p>
+          <a:p>
+            <a:pPr marL="0" indent="0" algn="ctr">
+              <a:buNone/>
+            </a:pPr>
+            <a:r>
+              <a:rPr lang="en-CA" b="1" dirty="0"/>
+              <a:t>Then: d1+d2+d3+...+d10&lt;=20=2x10, then |E| &lt;=10</a:t>
+            </a:r>
+          </a:p>
+          <a:p>
+            <a:pPr marL="0" indent="0" algn="ctr">
+              <a:buNone/>
+            </a:pPr>
+            <a:endParaRPr lang="en-CA" b="1" dirty="0"/>
+          </a:p>
+          <a:p>
+            <a:r>
+              <a:rPr lang="en-CA" dirty="0"/>
+              <a:t>By the degree sum formula, </a:t>
+            </a:r>
+          </a:p>
+          <a:p>
+            <a:r>
+              <a:rPr lang="en-CA" b="1" dirty="0"/>
+              <a:t>the sum of the total number of degrees = 2 x total number of edges.</a:t>
+            </a:r>
+            <a:endParaRPr lang="en-CA" dirty="0"/>
+          </a:p>
+          <a:p>
+            <a:r>
+              <a:rPr lang="en-CA" dirty="0"/>
+              <a:t>This implies that the </a:t>
+            </a:r>
+            <a:r>
+              <a:rPr lang="en-CA" b="1" dirty="0"/>
+              <a:t>maximum</a:t>
+            </a:r>
+            <a:r>
+              <a:rPr lang="en-CA" dirty="0"/>
+              <a:t> number of edges, i.e. games, is </a:t>
+            </a:r>
+            <a:r>
+              <a:rPr lang="en-CA" b="1" dirty="0"/>
+              <a:t>10</a:t>
+            </a:r>
+            <a:r>
+              <a:rPr lang="en-CA" dirty="0"/>
+              <a:t>, which is a </a:t>
+            </a:r>
+            <a:r>
+              <a:rPr lang="en-CA" b="1" dirty="0">
+                <a:solidFill>
+                  <a:srgbClr val="FF0000"/>
+                </a:solidFill>
+              </a:rPr>
+              <a:t>contradiction</a:t>
+            </a:r>
+            <a:r>
+              <a:rPr lang="en-CA" dirty="0"/>
+              <a:t>.</a:t>
+            </a:r>
+          </a:p>
+          <a:p>
+            <a:r>
+              <a:rPr lang="en-CA" dirty="0"/>
+              <a:t>Therefore; there has to be at least one player who has played at least 3 games.</a:t>
+            </a:r>
+          </a:p>
+        </p:txBody>
+      </p:sp>
+    </p:spTree>
+    <p:extLst>
+      <p:ext uri="{BB962C8B-B14F-4D97-AF65-F5344CB8AC3E}">
+        <p14:creationId xmlns:p14="http://schemas.microsoft.com/office/powerpoint/2010/main" val="2864509609"/>
+      </p:ext>
+    </p:extLst>
+  </p:cSld>
+  <p:clrMapOvr>
+    <a:masterClrMapping/>
+  </p:clrMapOvr>
+</p:sld>
+</file>
+
+<file path=ppt/slides/slide7.xml><?xml version="1.0" encoding="utf-8"?>
+<p:sld xmlns:a="http://schemas.openxmlformats.org/drawingml/2006/main" xmlns:r="http://schemas.openxmlformats.org/officeDocument/2006/relationships" xmlns:p="http://schemas.openxmlformats.org/presentationml/2006/main">
+  <p:cSld>
+    <p:spTree>
+      <p:nvGrpSpPr>
+        <p:cNvPr id="1" name=""/>
+        <p:cNvGrpSpPr/>
+        <p:nvPr/>
+      </p:nvGrpSpPr>
+      <p:grpSpPr>
+        <a:xfrm>
+          <a:off x="0" y="0"/>
+          <a:ext cx="0" cy="0"/>
+          <a:chOff x="0" y="0"/>
+          <a:chExt cx="0" cy="0"/>
+        </a:xfrm>
+      </p:grpSpPr>
+      <p:sp>
+        <p:nvSpPr>
+          <p:cNvPr id="2" name="Title 1">
+            <a:extLst>
+              <a:ext uri="{FF2B5EF4-FFF2-40B4-BE49-F238E27FC236}">
                 <a16:creationId xmlns:a16="http://schemas.microsoft.com/office/drawing/2014/main" id="{7AB78519-731D-4DCD-BF40-24BE1F86C713}"/>
               </a:ext>
             </a:extLst>
@@ -4930,12 +5022,23 @@
             <p:ph type="title"/>
           </p:nvPr>
         </p:nvSpPr>
-        <p:spPr/>
-        <p:txBody>
-          <a:bodyPr/>
-          <a:lstStyle/>
-          <a:p>
-            <a:endParaRPr lang="en-US"/>
+        <p:spPr>
+          <a:xfrm>
+            <a:off x="838200" y="365125"/>
+            <a:ext cx="10515600" cy="986597"/>
+          </a:xfrm>
+        </p:spPr>
+        <p:txBody>
+          <a:bodyPr>
+            <a:normAutofit/>
+          </a:bodyPr>
+          <a:lstStyle/>
+          <a:p>
+            <a:r>
+              <a:rPr lang="en-CA" sz="2500" dirty="0"/>
+              <a:t>Let G be a simple regular graph on n vertices such that every vertex has degree 2. Prove that G is the union of disjoint cycles.</a:t>
+            </a:r>
+            <a:endParaRPr lang="en-US" sz="2500" dirty="0"/>
           </a:p>
         </p:txBody>
       </p:sp>
@@ -4955,12 +5058,111 @@
             <p:ph idx="1"/>
           </p:nvPr>
         </p:nvSpPr>
-        <p:spPr/>
-        <p:txBody>
-          <a:bodyPr/>
-          <a:lstStyle/>
-          <a:p>
-            <a:endParaRPr lang="en-US"/>
+        <p:spPr>
+          <a:xfrm>
+            <a:off x="838200" y="1351722"/>
+            <a:ext cx="10515600" cy="5231958"/>
+          </a:xfrm>
+        </p:spPr>
+        <p:txBody>
+          <a:bodyPr>
+            <a:normAutofit fontScale="92500" lnSpcReduction="20000"/>
+          </a:bodyPr>
+          <a:lstStyle/>
+          <a:p>
+            <a:pPr marL="0" indent="0">
+              <a:buNone/>
+            </a:pPr>
+            <a:r>
+              <a:rPr lang="en-CA" dirty="0"/>
+              <a:t>Note: A graph is said to be simple if it has no loops and every pair of vertices has at most one edge between them. A simple graph is said to be regular if every vertex has the same degree</a:t>
+            </a:r>
+          </a:p>
+          <a:p>
+            <a:r>
+              <a:rPr lang="en-CA" dirty="0"/>
+              <a:t>Pick a random vertex </a:t>
+            </a:r>
+            <a:r>
+              <a:rPr lang="en-CA" b="1" dirty="0"/>
+              <a:t>v1</a:t>
+            </a:r>
+            <a:r>
+              <a:rPr lang="en-CA" dirty="0"/>
+              <a:t> from </a:t>
+            </a:r>
+            <a:r>
+              <a:rPr lang="en-CA" b="1" dirty="0"/>
+              <a:t>G</a:t>
+            </a:r>
+            <a:r>
+              <a:rPr lang="en-CA" dirty="0"/>
+              <a:t>, and let </a:t>
+            </a:r>
+            <a:r>
+              <a:rPr lang="en-CA" b="1" dirty="0"/>
+              <a:t>v1</a:t>
+            </a:r>
+            <a:r>
+              <a:rPr lang="en-CA" dirty="0"/>
+              <a:t> be connected to </a:t>
+            </a:r>
+            <a:r>
+              <a:rPr lang="en-CA" b="1" dirty="0"/>
+              <a:t>v2</a:t>
+            </a:r>
+            <a:r>
+              <a:rPr lang="en-CA" dirty="0"/>
+              <a:t> and </a:t>
+            </a:r>
+            <a:r>
+              <a:rPr lang="en-CA" b="1" dirty="0" err="1"/>
+              <a:t>vk</a:t>
+            </a:r>
+            <a:r>
+              <a:rPr lang="en-CA" dirty="0"/>
+              <a:t> since the degree of all vertices is 2,</a:t>
+            </a:r>
+            <a:r>
+              <a:rPr lang="en-CA" b="1" dirty="0"/>
+              <a:t> G is 2-regular.</a:t>
+            </a:r>
+            <a:r>
+              <a:rPr lang="en-CA" dirty="0"/>
+              <a:t> Now, starting from v1 keep going in a direction, to find all the vertices of the </a:t>
+            </a:r>
+            <a:r>
+              <a:rPr lang="en-CA" b="1" dirty="0"/>
+              <a:t>current cycle, </a:t>
+            </a:r>
+            <a:r>
+              <a:rPr lang="en-CA" dirty="0"/>
+              <a:t>since at some point there is no new vertex to go to, since the degree of the current vertex is 2, we have to go back to one of the vertices that we have already visited. Let that vertex be vi, the only possibility for vi is the initial vertex since it has degree 2 and we have only used one of its edges so far, otherwise if we go to some other vertex that we have visited than the initial one then the degree of that vertex will exceed 2, as we have already used both of its edges. Since all the vertices have degree 2, then the resulting walk is either, v1 -&gt; v2 -&gt; … -&gt; </a:t>
+            </a:r>
+            <a:r>
+              <a:rPr lang="en-CA" dirty="0" err="1"/>
+              <a:t>vk</a:t>
+            </a:r>
+            <a:r>
+              <a:rPr lang="en-CA" dirty="0"/>
+              <a:t> -&gt; v1, or v1 -&gt; </a:t>
+            </a:r>
+            <a:r>
+              <a:rPr lang="en-CA" dirty="0" err="1"/>
+              <a:t>vk</a:t>
+            </a:r>
+            <a:r>
+              <a:rPr lang="en-CA" dirty="0"/>
+              <a:t> -&gt; vk-1 -&gt; … -&gt; v2 -&gt; v1. Both of which are the vertices of a </a:t>
+            </a:r>
+            <a:r>
+              <a:rPr lang="en-CA" b="1" dirty="0"/>
+              <a:t>connected 2-regular subgraph, cycle. </a:t>
+            </a:r>
+            <a:r>
+              <a:rPr lang="en-CA" dirty="0"/>
+              <a:t> </a:t>
+            </a:r>
           </a:p>
         </p:txBody>
       </p:sp>
@@ -4977,7 +5179,152 @@
 </p:sld>
 </file>
 
-<file path=ppt/slides/slide7.xml><?xml version="1.0" encoding="utf-8"?>
+<file path=ppt/slides/slide8.xml><?xml version="1.0" encoding="utf-8"?>
+<p:sld xmlns:a="http://schemas.openxmlformats.org/drawingml/2006/main" xmlns:r="http://schemas.openxmlformats.org/officeDocument/2006/relationships" xmlns:p="http://schemas.openxmlformats.org/presentationml/2006/main">
+  <p:cSld>
+    <p:spTree>
+      <p:nvGrpSpPr>
+        <p:cNvPr id="1" name=""/>
+        <p:cNvGrpSpPr/>
+        <p:nvPr/>
+      </p:nvGrpSpPr>
+      <p:grpSpPr>
+        <a:xfrm>
+          <a:off x="0" y="0"/>
+          <a:ext cx="0" cy="0"/>
+          <a:chOff x="0" y="0"/>
+          <a:chExt cx="0" cy="0"/>
+        </a:xfrm>
+      </p:grpSpPr>
+      <p:sp>
+        <p:nvSpPr>
+          <p:cNvPr id="2" name="Title 1">
+            <a:extLst>
+              <a:ext uri="{FF2B5EF4-FFF2-40B4-BE49-F238E27FC236}">
+                <a16:creationId xmlns:a16="http://schemas.microsoft.com/office/drawing/2014/main" id="{5DA6EC12-8EF3-428C-8B06-F72C531F3A92}"/>
+              </a:ext>
+            </a:extLst>
+          </p:cNvPr>
+          <p:cNvSpPr>
+            <a:spLocks noGrp="1"/>
+          </p:cNvSpPr>
+          <p:nvPr>
+            <p:ph type="title"/>
+          </p:nvPr>
+        </p:nvSpPr>
+        <p:spPr/>
+        <p:txBody>
+          <a:bodyPr>
+            <a:normAutofit/>
+          </a:bodyPr>
+          <a:lstStyle/>
+          <a:p>
+            <a:r>
+              <a:rPr lang="en-CA" sz="2400" dirty="0"/>
+              <a:t>Let G be a simple regular graph on n vertices such that every vertex has degree 2. Prove that G is the union of disjoint cycles.</a:t>
+            </a:r>
+            <a:endParaRPr lang="en-US" sz="2400" dirty="0"/>
+          </a:p>
+        </p:txBody>
+      </p:sp>
+      <p:sp>
+        <p:nvSpPr>
+          <p:cNvPr id="3" name="Content Placeholder 2">
+            <a:extLst>
+              <a:ext uri="{FF2B5EF4-FFF2-40B4-BE49-F238E27FC236}">
+                <a16:creationId xmlns:a16="http://schemas.microsoft.com/office/drawing/2014/main" id="{23341BA1-3257-4477-B72E-075BE28BF734}"/>
+              </a:ext>
+            </a:extLst>
+          </p:cNvPr>
+          <p:cNvSpPr>
+            <a:spLocks noGrp="1"/>
+          </p:cNvSpPr>
+          <p:nvPr>
+            <p:ph idx="1"/>
+          </p:nvPr>
+        </p:nvSpPr>
+        <p:spPr/>
+        <p:txBody>
+          <a:bodyPr/>
+          <a:lstStyle/>
+          <a:p>
+            <a:r>
+              <a:rPr lang="en-CA" dirty="0"/>
+              <a:t>Now, </a:t>
+            </a:r>
+            <a:r>
+              <a:rPr lang="en-CA" b="1" dirty="0"/>
+              <a:t>take out the cycle</a:t>
+            </a:r>
+            <a:r>
+              <a:rPr lang="en-CA" dirty="0"/>
+              <a:t> that we found, i.e. v1-v2-...vk-v1, from graph G. </a:t>
+            </a:r>
+          </a:p>
+          <a:p>
+            <a:r>
+              <a:rPr lang="en-CA" b="1" dirty="0"/>
+              <a:t>Repeat</a:t>
+            </a:r>
+            <a:r>
+              <a:rPr lang="en-CA" dirty="0"/>
+              <a:t> the process in 1 and 2 to </a:t>
+            </a:r>
+            <a:r>
+              <a:rPr lang="en-CA" b="1" dirty="0"/>
+              <a:t>find and remove another cycle.</a:t>
+            </a:r>
+            <a:endParaRPr lang="en-CA" dirty="0"/>
+          </a:p>
+          <a:p>
+            <a:r>
+              <a:rPr lang="en-CA" b="1" dirty="0"/>
+              <a:t>Stop</a:t>
+            </a:r>
+            <a:r>
+              <a:rPr lang="en-CA" dirty="0"/>
+              <a:t> when there are</a:t>
+            </a:r>
+            <a:r>
+              <a:rPr lang="en-CA" b="1" dirty="0"/>
+              <a:t> no more</a:t>
+            </a:r>
+            <a:r>
+              <a:rPr lang="en-CA" dirty="0"/>
+              <a:t> vertices left in G to pick.</a:t>
+            </a:r>
+          </a:p>
+          <a:p>
+            <a:r>
+              <a:rPr lang="en-CA" dirty="0"/>
+              <a:t>Following the steps above, we can find all the </a:t>
+            </a:r>
+            <a:r>
+              <a:rPr lang="en-CA" b="1" dirty="0"/>
+              <a:t>disjoint</a:t>
+            </a:r>
+            <a:r>
+              <a:rPr lang="en-CA" dirty="0"/>
+              <a:t> cycles of the graph G.</a:t>
+            </a:r>
+            <a:endParaRPr lang="en-US" dirty="0"/>
+          </a:p>
+        </p:txBody>
+      </p:sp>
+    </p:spTree>
+    <p:extLst>
+      <p:ext uri="{BB962C8B-B14F-4D97-AF65-F5344CB8AC3E}">
+        <p14:creationId xmlns:p14="http://schemas.microsoft.com/office/powerpoint/2010/main" val="184937713"/>
+      </p:ext>
+    </p:extLst>
+  </p:cSld>
+  <p:clrMapOvr>
+    <a:masterClrMapping/>
+  </p:clrMapOvr>
+</p:sld>
+</file>
+
+<file path=ppt/slides/slide9.xml><?xml version="1.0" encoding="utf-8"?>
 <p:sld xmlns:a="http://schemas.openxmlformats.org/drawingml/2006/main" xmlns:r="http://schemas.openxmlformats.org/officeDocument/2006/relationships" xmlns:p="http://schemas.openxmlformats.org/presentationml/2006/main">
   <p:cSld>
     <p:spTree>

</xml_diff>